<commit_message>
Moved the docs overview, updated the figure and text, and synced with the main branch
</commit_message>
<xml_diff>
--- a/docs/source/img/nwb_documentation_overview.pptx
+++ b/docs/source/img/nwb_documentation_overview.pptx
@@ -5,10 +5,11 @@
     <p:sldMasterId id="2147483648" r:id="rId1"/>
   </p:sldMasterIdLst>
   <p:notesMasterIdLst>
-    <p:notesMasterId r:id="rId3"/>
+    <p:notesMasterId r:id="rId4"/>
   </p:notesMasterIdLst>
   <p:sldIdLst>
-    <p:sldId id="256" r:id="rId2"/>
+    <p:sldId id="257" r:id="rId2"/>
+    <p:sldId id="256" r:id="rId3"/>
   </p:sldIdLst>
   <p:sldSz cx="12192000" cy="6858000"/>
   <p:notesSz cx="6858000" cy="9144000"/>
@@ -115,7 +116,7 @@
             <a:srgbClr val="A4A3A4"/>
           </p15:clr>
         </p15:guide>
-        <p15:guide id="2" pos="6432" userDrawn="1">
+        <p15:guide id="2" pos="3456" userDrawn="1">
           <p15:clr>
             <a:srgbClr val="A4A3A4"/>
           </p15:clr>
@@ -208,7 +209,7 @@
           <a:p>
             <a:fld id="{90CC8591-00E6-8043-AC8C-8824F70995D3}" type="datetimeFigureOut">
               <a:rPr lang="en-US" smtClean="0"/>
-              <a:t>4/7/22</a:t>
+              <a:t>4/8/22</a:t>
             </a:fld>
             <a:endParaRPr lang="en-US"/>
           </a:p>
@@ -549,6 +550,90 @@
     </p:spTree>
     <p:extLst>
       <p:ext uri="{BB962C8B-B14F-4D97-AF65-F5344CB8AC3E}">
+        <p14:creationId xmlns:p14="http://schemas.microsoft.com/office/powerpoint/2010/main" val="1066238277"/>
+      </p:ext>
+    </p:extLst>
+  </p:cSld>
+  <p:clrMapOvr>
+    <a:masterClrMapping/>
+  </p:clrMapOvr>
+</p:notes>
+</file>
+
+<file path=ppt/notesSlides/notesSlide2.xml><?xml version="1.0" encoding="utf-8"?>
+<p:notes xmlns:a="http://schemas.openxmlformats.org/drawingml/2006/main" xmlns:r="http://schemas.openxmlformats.org/officeDocument/2006/relationships" xmlns:p="http://schemas.openxmlformats.org/presentationml/2006/main">
+  <p:cSld>
+    <p:spTree>
+      <p:nvGrpSpPr>
+        <p:cNvPr id="1" name=""/>
+        <p:cNvGrpSpPr/>
+        <p:nvPr/>
+      </p:nvGrpSpPr>
+      <p:grpSpPr>
+        <a:xfrm>
+          <a:off x="0" y="0"/>
+          <a:ext cx="0" cy="0"/>
+          <a:chOff x="0" y="0"/>
+          <a:chExt cx="0" cy="0"/>
+        </a:xfrm>
+      </p:grpSpPr>
+      <p:sp>
+        <p:nvSpPr>
+          <p:cNvPr id="2" name="Slide Image Placeholder 1"/>
+          <p:cNvSpPr>
+            <a:spLocks noGrp="1" noRot="1" noChangeAspect="1"/>
+          </p:cNvSpPr>
+          <p:nvPr>
+            <p:ph type="sldImg"/>
+          </p:nvPr>
+        </p:nvSpPr>
+        <p:spPr/>
+      </p:sp>
+      <p:sp>
+        <p:nvSpPr>
+          <p:cNvPr id="3" name="Notes Placeholder 2"/>
+          <p:cNvSpPr>
+            <a:spLocks noGrp="1"/>
+          </p:cNvSpPr>
+          <p:nvPr>
+            <p:ph type="body" idx="1"/>
+          </p:nvPr>
+        </p:nvSpPr>
+        <p:spPr/>
+        <p:txBody>
+          <a:bodyPr/>
+          <a:lstStyle/>
+          <a:p>
+            <a:endParaRPr lang="en-US" dirty="0"/>
+          </a:p>
+        </p:txBody>
+      </p:sp>
+      <p:sp>
+        <p:nvSpPr>
+          <p:cNvPr id="4" name="Slide Number Placeholder 3"/>
+          <p:cNvSpPr>
+            <a:spLocks noGrp="1"/>
+          </p:cNvSpPr>
+          <p:nvPr>
+            <p:ph type="sldNum" sz="quarter" idx="5"/>
+          </p:nvPr>
+        </p:nvSpPr>
+        <p:spPr/>
+        <p:txBody>
+          <a:bodyPr/>
+          <a:lstStyle/>
+          <a:p>
+            <a:fld id="{5D84BB70-F0C2-CD49-9BB7-4B92F245533D}" type="slidenum">
+              <a:rPr lang="en-US" smtClean="0"/>
+              <a:t>2</a:t>
+            </a:fld>
+            <a:endParaRPr lang="en-US"/>
+          </a:p>
+        </p:txBody>
+      </p:sp>
+    </p:spTree>
+    <p:extLst>
+      <p:ext uri="{BB962C8B-B14F-4D97-AF65-F5344CB8AC3E}">
         <p14:creationId xmlns:p14="http://schemas.microsoft.com/office/powerpoint/2010/main" val="3481006190"/>
       </p:ext>
     </p:extLst>
@@ -706,7 +791,7 @@
           <a:p>
             <a:fld id="{C27EA7B6-B426-4140-A45E-2E5607F1F1C8}" type="datetimeFigureOut">
               <a:rPr lang="en-US" smtClean="0"/>
-              <a:t>4/7/22</a:t>
+              <a:t>4/8/22</a:t>
             </a:fld>
             <a:endParaRPr lang="en-US"/>
           </a:p>
@@ -904,7 +989,7 @@
           <a:p>
             <a:fld id="{C27EA7B6-B426-4140-A45E-2E5607F1F1C8}" type="datetimeFigureOut">
               <a:rPr lang="en-US" smtClean="0"/>
-              <a:t>4/7/22</a:t>
+              <a:t>4/8/22</a:t>
             </a:fld>
             <a:endParaRPr lang="en-US"/>
           </a:p>
@@ -1112,7 +1197,7 @@
           <a:p>
             <a:fld id="{C27EA7B6-B426-4140-A45E-2E5607F1F1C8}" type="datetimeFigureOut">
               <a:rPr lang="en-US" smtClean="0"/>
-              <a:t>4/7/22</a:t>
+              <a:t>4/8/22</a:t>
             </a:fld>
             <a:endParaRPr lang="en-US"/>
           </a:p>
@@ -1310,7 +1395,7 @@
           <a:p>
             <a:fld id="{C27EA7B6-B426-4140-A45E-2E5607F1F1C8}" type="datetimeFigureOut">
               <a:rPr lang="en-US" smtClean="0"/>
-              <a:t>4/7/22</a:t>
+              <a:t>4/8/22</a:t>
             </a:fld>
             <a:endParaRPr lang="en-US"/>
           </a:p>
@@ -1585,7 +1670,7 @@
           <a:p>
             <a:fld id="{C27EA7B6-B426-4140-A45E-2E5607F1F1C8}" type="datetimeFigureOut">
               <a:rPr lang="en-US" smtClean="0"/>
-              <a:t>4/7/22</a:t>
+              <a:t>4/8/22</a:t>
             </a:fld>
             <a:endParaRPr lang="en-US"/>
           </a:p>
@@ -1850,7 +1935,7 @@
           <a:p>
             <a:fld id="{C27EA7B6-B426-4140-A45E-2E5607F1F1C8}" type="datetimeFigureOut">
               <a:rPr lang="en-US" smtClean="0"/>
-              <a:t>4/7/22</a:t>
+              <a:t>4/8/22</a:t>
             </a:fld>
             <a:endParaRPr lang="en-US"/>
           </a:p>
@@ -2262,7 +2347,7 @@
           <a:p>
             <a:fld id="{C27EA7B6-B426-4140-A45E-2E5607F1F1C8}" type="datetimeFigureOut">
               <a:rPr lang="en-US" smtClean="0"/>
-              <a:t>4/7/22</a:t>
+              <a:t>4/8/22</a:t>
             </a:fld>
             <a:endParaRPr lang="en-US"/>
           </a:p>
@@ -2403,7 +2488,7 @@
           <a:p>
             <a:fld id="{C27EA7B6-B426-4140-A45E-2E5607F1F1C8}" type="datetimeFigureOut">
               <a:rPr lang="en-US" smtClean="0"/>
-              <a:t>4/7/22</a:t>
+              <a:t>4/8/22</a:t>
             </a:fld>
             <a:endParaRPr lang="en-US"/>
           </a:p>
@@ -2516,7 +2601,7 @@
           <a:p>
             <a:fld id="{C27EA7B6-B426-4140-A45E-2E5607F1F1C8}" type="datetimeFigureOut">
               <a:rPr lang="en-US" smtClean="0"/>
-              <a:t>4/7/22</a:t>
+              <a:t>4/8/22</a:t>
             </a:fld>
             <a:endParaRPr lang="en-US"/>
           </a:p>
@@ -2827,7 +2912,7 @@
           <a:p>
             <a:fld id="{C27EA7B6-B426-4140-A45E-2E5607F1F1C8}" type="datetimeFigureOut">
               <a:rPr lang="en-US" smtClean="0"/>
-              <a:t>4/7/22</a:t>
+              <a:t>4/8/22</a:t>
             </a:fld>
             <a:endParaRPr lang="en-US"/>
           </a:p>
@@ -3115,7 +3200,7 @@
           <a:p>
             <a:fld id="{C27EA7B6-B426-4140-A45E-2E5607F1F1C8}" type="datetimeFigureOut">
               <a:rPr lang="en-US" smtClean="0"/>
-              <a:t>4/7/22</a:t>
+              <a:t>4/8/22</a:t>
             </a:fld>
             <a:endParaRPr lang="en-US"/>
           </a:p>
@@ -3356,7 +3441,7 @@
           <a:p>
             <a:fld id="{C27EA7B6-B426-4140-A45E-2E5607F1F1C8}" type="datetimeFigureOut">
               <a:rPr lang="en-US" smtClean="0"/>
-              <a:t>4/7/22</a:t>
+              <a:t>4/8/22</a:t>
             </a:fld>
             <a:endParaRPr lang="en-US"/>
           </a:p>
@@ -3757,6 +3842,1597 @@
 </file>
 
 <file path=ppt/slides/slide1.xml><?xml version="1.0" encoding="utf-8"?>
+<p:sld xmlns:a="http://schemas.openxmlformats.org/drawingml/2006/main" xmlns:r="http://schemas.openxmlformats.org/officeDocument/2006/relationships" xmlns:p="http://schemas.openxmlformats.org/presentationml/2006/main">
+  <p:cSld>
+    <p:spTree>
+      <p:nvGrpSpPr>
+        <p:cNvPr id="1" name=""/>
+        <p:cNvGrpSpPr/>
+        <p:nvPr/>
+      </p:nvGrpSpPr>
+      <p:grpSpPr>
+        <a:xfrm>
+          <a:off x="0" y="0"/>
+          <a:ext cx="0" cy="0"/>
+          <a:chOff x="0" y="0"/>
+          <a:chExt cx="0" cy="0"/>
+        </a:xfrm>
+      </p:grpSpPr>
+      <p:sp>
+        <p:nvSpPr>
+          <p:cNvPr id="14" name="Triangle 13">
+            <a:extLst>
+              <a:ext uri="{FF2B5EF4-FFF2-40B4-BE49-F238E27FC236}">
+                <a16:creationId xmlns:a16="http://schemas.microsoft.com/office/drawing/2014/main" id="{BC562FCB-D9B1-8D43-AF1B-B525134CA759}"/>
+              </a:ext>
+            </a:extLst>
+          </p:cNvPr>
+          <p:cNvSpPr>
+            <a:spLocks noChangeAspect="1"/>
+          </p:cNvSpPr>
+          <p:nvPr/>
+        </p:nvSpPr>
+        <p:spPr>
+          <a:xfrm>
+            <a:off x="2574925" y="640809"/>
+            <a:ext cx="5803900" cy="4477376"/>
+          </a:xfrm>
+          <a:prstGeom prst="triangle">
+            <a:avLst/>
+          </a:prstGeom>
+          <a:solidFill>
+            <a:srgbClr val="6FA8DC"/>
+          </a:solidFill>
+          <a:ln w="28575">
+            <a:solidFill>
+              <a:schemeClr val="bg1"/>
+            </a:solidFill>
+          </a:ln>
+        </p:spPr>
+        <p:style>
+          <a:lnRef idx="2">
+            <a:schemeClr val="accent1">
+              <a:shade val="50000"/>
+            </a:schemeClr>
+          </a:lnRef>
+          <a:fillRef idx="1">
+            <a:schemeClr val="accent1"/>
+          </a:fillRef>
+          <a:effectRef idx="0">
+            <a:schemeClr val="accent1"/>
+          </a:effectRef>
+          <a:fontRef idx="minor">
+            <a:schemeClr val="lt1"/>
+          </a:fontRef>
+        </p:style>
+        <p:txBody>
+          <a:bodyPr rtlCol="0" anchor="ctr"/>
+          <a:lstStyle/>
+          <a:p>
+            <a:pPr algn="ctr"/>
+            <a:endParaRPr lang="en-US" sz="1400">
+              <a:latin typeface="Arial" panose="020B0604020202020204" pitchFamily="34" charset="0"/>
+              <a:cs typeface="Arial" panose="020B0604020202020204" pitchFamily="34" charset="0"/>
+            </a:endParaRPr>
+          </a:p>
+        </p:txBody>
+      </p:sp>
+      <p:sp>
+        <p:nvSpPr>
+          <p:cNvPr id="22" name="Triangle 21">
+            <a:extLst>
+              <a:ext uri="{FF2B5EF4-FFF2-40B4-BE49-F238E27FC236}">
+                <a16:creationId xmlns:a16="http://schemas.microsoft.com/office/drawing/2014/main" id="{7CC10ADD-FB2F-A54E-9B55-4DCC87F62B78}"/>
+              </a:ext>
+            </a:extLst>
+          </p:cNvPr>
+          <p:cNvSpPr>
+            <a:spLocks noChangeAspect="1"/>
+          </p:cNvSpPr>
+          <p:nvPr/>
+        </p:nvSpPr>
+        <p:spPr>
+          <a:xfrm>
+            <a:off x="3057524" y="640809"/>
+            <a:ext cx="4845051" cy="3743172"/>
+          </a:xfrm>
+          <a:prstGeom prst="triangle">
+            <a:avLst/>
+          </a:prstGeom>
+          <a:solidFill>
+            <a:srgbClr val="F7B26B"/>
+          </a:solidFill>
+          <a:ln w="28575">
+            <a:solidFill>
+              <a:schemeClr val="bg1"/>
+            </a:solidFill>
+          </a:ln>
+        </p:spPr>
+        <p:style>
+          <a:lnRef idx="2">
+            <a:schemeClr val="accent1">
+              <a:shade val="50000"/>
+            </a:schemeClr>
+          </a:lnRef>
+          <a:fillRef idx="1">
+            <a:schemeClr val="accent1"/>
+          </a:fillRef>
+          <a:effectRef idx="0">
+            <a:schemeClr val="accent1"/>
+          </a:effectRef>
+          <a:fontRef idx="minor">
+            <a:schemeClr val="lt1"/>
+          </a:fontRef>
+        </p:style>
+        <p:txBody>
+          <a:bodyPr rtlCol="0" anchor="ctr"/>
+          <a:lstStyle/>
+          <a:p>
+            <a:pPr algn="ctr"/>
+            <a:endParaRPr lang="en-US" sz="1400">
+              <a:latin typeface="Arial" panose="020B0604020202020204" pitchFamily="34" charset="0"/>
+              <a:cs typeface="Arial" panose="020B0604020202020204" pitchFamily="34" charset="0"/>
+            </a:endParaRPr>
+          </a:p>
+        </p:txBody>
+      </p:sp>
+      <p:sp>
+        <p:nvSpPr>
+          <p:cNvPr id="30" name="Triangle 29">
+            <a:extLst>
+              <a:ext uri="{FF2B5EF4-FFF2-40B4-BE49-F238E27FC236}">
+                <a16:creationId xmlns:a16="http://schemas.microsoft.com/office/drawing/2014/main" id="{D20212E4-55CB-D14B-BAF4-81381B26BEC5}"/>
+              </a:ext>
+            </a:extLst>
+          </p:cNvPr>
+          <p:cNvSpPr>
+            <a:spLocks noChangeAspect="1"/>
+          </p:cNvSpPr>
+          <p:nvPr/>
+        </p:nvSpPr>
+        <p:spPr>
+          <a:xfrm>
+            <a:off x="3545246" y="625106"/>
+            <a:ext cx="3869545" cy="3008710"/>
+          </a:xfrm>
+          <a:prstGeom prst="triangle">
+            <a:avLst/>
+          </a:prstGeom>
+          <a:solidFill>
+            <a:srgbClr val="9C83BB"/>
+          </a:solidFill>
+          <a:ln w="28575">
+            <a:solidFill>
+              <a:schemeClr val="bg1"/>
+            </a:solidFill>
+          </a:ln>
+        </p:spPr>
+        <p:style>
+          <a:lnRef idx="2">
+            <a:schemeClr val="accent1">
+              <a:shade val="50000"/>
+            </a:schemeClr>
+          </a:lnRef>
+          <a:fillRef idx="1">
+            <a:schemeClr val="accent1"/>
+          </a:fillRef>
+          <a:effectRef idx="0">
+            <a:schemeClr val="accent1"/>
+          </a:effectRef>
+          <a:fontRef idx="minor">
+            <a:schemeClr val="lt1"/>
+          </a:fontRef>
+        </p:style>
+        <p:txBody>
+          <a:bodyPr rtlCol="0" anchor="ctr"/>
+          <a:lstStyle/>
+          <a:p>
+            <a:pPr algn="ctr"/>
+            <a:endParaRPr lang="en-US" sz="1400">
+              <a:latin typeface="Arial" panose="020B0604020202020204" pitchFamily="34" charset="0"/>
+              <a:cs typeface="Arial" panose="020B0604020202020204" pitchFamily="34" charset="0"/>
+            </a:endParaRPr>
+          </a:p>
+        </p:txBody>
+      </p:sp>
+      <p:sp>
+        <p:nvSpPr>
+          <p:cNvPr id="9" name="Triangle 8">
+            <a:extLst>
+              <a:ext uri="{FF2B5EF4-FFF2-40B4-BE49-F238E27FC236}">
+                <a16:creationId xmlns:a16="http://schemas.microsoft.com/office/drawing/2014/main" id="{FBD625DF-87FF-2B4D-8C5A-FF2118ED5FA9}"/>
+              </a:ext>
+            </a:extLst>
+          </p:cNvPr>
+          <p:cNvSpPr>
+            <a:spLocks noChangeAspect="1"/>
+          </p:cNvSpPr>
+          <p:nvPr/>
+        </p:nvSpPr>
+        <p:spPr>
+          <a:xfrm>
+            <a:off x="4438996" y="661916"/>
+            <a:ext cx="2101458" cy="1630390"/>
+          </a:xfrm>
+          <a:prstGeom prst="triangle">
+            <a:avLst/>
+          </a:prstGeom>
+          <a:solidFill>
+            <a:schemeClr val="tx1"/>
+          </a:solidFill>
+          <a:ln w="28575">
+            <a:solidFill>
+              <a:schemeClr val="bg1"/>
+            </a:solidFill>
+          </a:ln>
+        </p:spPr>
+        <p:style>
+          <a:lnRef idx="2">
+            <a:schemeClr val="accent1">
+              <a:shade val="50000"/>
+            </a:schemeClr>
+          </a:lnRef>
+          <a:fillRef idx="1">
+            <a:schemeClr val="accent1"/>
+          </a:fillRef>
+          <a:effectRef idx="0">
+            <a:schemeClr val="accent1"/>
+          </a:effectRef>
+          <a:fontRef idx="minor">
+            <a:schemeClr val="lt1"/>
+          </a:fontRef>
+        </p:style>
+        <p:txBody>
+          <a:bodyPr rtlCol="0" anchor="ctr"/>
+          <a:lstStyle/>
+          <a:p>
+            <a:pPr algn="ctr"/>
+            <a:endParaRPr lang="en-US" sz="1400">
+              <a:latin typeface="Arial" panose="020B0604020202020204" pitchFamily="34" charset="0"/>
+              <a:cs typeface="Arial" panose="020B0604020202020204" pitchFamily="34" charset="0"/>
+            </a:endParaRPr>
+          </a:p>
+        </p:txBody>
+      </p:sp>
+      <p:sp>
+        <p:nvSpPr>
+          <p:cNvPr id="5" name="Triangle 4">
+            <a:extLst>
+              <a:ext uri="{FF2B5EF4-FFF2-40B4-BE49-F238E27FC236}">
+                <a16:creationId xmlns:a16="http://schemas.microsoft.com/office/drawing/2014/main" id="{29A2F838-92E0-B14A-9C5C-CD0CEE72BB0F}"/>
+              </a:ext>
+            </a:extLst>
+          </p:cNvPr>
+          <p:cNvSpPr/>
+          <p:nvPr/>
+        </p:nvSpPr>
+        <p:spPr>
+          <a:xfrm>
+            <a:off x="4971011" y="661916"/>
+            <a:ext cx="1036023" cy="804030"/>
+          </a:xfrm>
+          <a:prstGeom prst="triangle">
+            <a:avLst/>
+          </a:prstGeom>
+          <a:solidFill>
+            <a:srgbClr val="104B7C"/>
+          </a:solidFill>
+          <a:ln w="28575">
+            <a:solidFill>
+              <a:schemeClr val="bg1"/>
+            </a:solidFill>
+          </a:ln>
+        </p:spPr>
+        <p:style>
+          <a:lnRef idx="2">
+            <a:schemeClr val="accent1">
+              <a:shade val="50000"/>
+            </a:schemeClr>
+          </a:lnRef>
+          <a:fillRef idx="1">
+            <a:schemeClr val="accent1"/>
+          </a:fillRef>
+          <a:effectRef idx="0">
+            <a:schemeClr val="accent1"/>
+          </a:effectRef>
+          <a:fontRef idx="minor">
+            <a:schemeClr val="lt1"/>
+          </a:fontRef>
+        </p:style>
+        <p:txBody>
+          <a:bodyPr rtlCol="0" anchor="ctr"/>
+          <a:lstStyle/>
+          <a:p>
+            <a:pPr algn="ctr"/>
+            <a:endParaRPr lang="en-US" sz="1400">
+              <a:latin typeface="Arial" panose="020B0604020202020204" pitchFamily="34" charset="0"/>
+              <a:cs typeface="Arial" panose="020B0604020202020204" pitchFamily="34" charset="0"/>
+            </a:endParaRPr>
+          </a:p>
+        </p:txBody>
+      </p:sp>
+      <p:sp>
+        <p:nvSpPr>
+          <p:cNvPr id="17" name="Trapezoid 16">
+            <a:extLst>
+              <a:ext uri="{FF2B5EF4-FFF2-40B4-BE49-F238E27FC236}">
+                <a16:creationId xmlns:a16="http://schemas.microsoft.com/office/drawing/2014/main" id="{CC05F036-7D45-C045-8C11-349083C4060D}"/>
+              </a:ext>
+            </a:extLst>
+          </p:cNvPr>
+          <p:cNvSpPr/>
+          <p:nvPr/>
+        </p:nvSpPr>
+        <p:spPr>
+          <a:xfrm>
+            <a:off x="5699932" y="2295348"/>
+            <a:ext cx="1317173" cy="700275"/>
+          </a:xfrm>
+          <a:custGeom>
+            <a:avLst/>
+            <a:gdLst>
+              <a:gd name="connsiteX0" fmla="*/ 0 w 1941305"/>
+              <a:gd name="connsiteY0" fmla="*/ 734763 h 734763"/>
+              <a:gd name="connsiteX1" fmla="*/ 433628 w 1941305"/>
+              <a:gd name="connsiteY1" fmla="*/ 0 h 734763"/>
+              <a:gd name="connsiteX2" fmla="*/ 1507677 w 1941305"/>
+              <a:gd name="connsiteY2" fmla="*/ 0 h 734763"/>
+              <a:gd name="connsiteX3" fmla="*/ 1941305 w 1941305"/>
+              <a:gd name="connsiteY3" fmla="*/ 734763 h 734763"/>
+              <a:gd name="connsiteX4" fmla="*/ 0 w 1941305"/>
+              <a:gd name="connsiteY4" fmla="*/ 734763 h 734763"/>
+              <a:gd name="connsiteX0" fmla="*/ 0 w 1642601"/>
+              <a:gd name="connsiteY0" fmla="*/ 740859 h 740859"/>
+              <a:gd name="connsiteX1" fmla="*/ 134924 w 1642601"/>
+              <a:gd name="connsiteY1" fmla="*/ 0 h 740859"/>
+              <a:gd name="connsiteX2" fmla="*/ 1208973 w 1642601"/>
+              <a:gd name="connsiteY2" fmla="*/ 0 h 740859"/>
+              <a:gd name="connsiteX3" fmla="*/ 1642601 w 1642601"/>
+              <a:gd name="connsiteY3" fmla="*/ 734763 h 740859"/>
+              <a:gd name="connsiteX4" fmla="*/ 0 w 1642601"/>
+              <a:gd name="connsiteY4" fmla="*/ 740859 h 740859"/>
+              <a:gd name="connsiteX0" fmla="*/ 0 w 1642601"/>
+              <a:gd name="connsiteY0" fmla="*/ 740859 h 740859"/>
+              <a:gd name="connsiteX1" fmla="*/ 13004 w 1642601"/>
+              <a:gd name="connsiteY1" fmla="*/ 0 h 740859"/>
+              <a:gd name="connsiteX2" fmla="*/ 1208973 w 1642601"/>
+              <a:gd name="connsiteY2" fmla="*/ 0 h 740859"/>
+              <a:gd name="connsiteX3" fmla="*/ 1642601 w 1642601"/>
+              <a:gd name="connsiteY3" fmla="*/ 734763 h 740859"/>
+              <a:gd name="connsiteX4" fmla="*/ 0 w 1642601"/>
+              <a:gd name="connsiteY4" fmla="*/ 740859 h 740859"/>
+              <a:gd name="connsiteX0" fmla="*/ 0 w 1642601"/>
+              <a:gd name="connsiteY0" fmla="*/ 740859 h 740859"/>
+              <a:gd name="connsiteX1" fmla="*/ 6908 w 1642601"/>
+              <a:gd name="connsiteY1" fmla="*/ 0 h 740859"/>
+              <a:gd name="connsiteX2" fmla="*/ 1208973 w 1642601"/>
+              <a:gd name="connsiteY2" fmla="*/ 0 h 740859"/>
+              <a:gd name="connsiteX3" fmla="*/ 1642601 w 1642601"/>
+              <a:gd name="connsiteY3" fmla="*/ 734763 h 740859"/>
+              <a:gd name="connsiteX4" fmla="*/ 0 w 1642601"/>
+              <a:gd name="connsiteY4" fmla="*/ 740859 h 740859"/>
+              <a:gd name="connsiteX0" fmla="*/ 3076 w 1645677"/>
+              <a:gd name="connsiteY0" fmla="*/ 740859 h 740859"/>
+              <a:gd name="connsiteX1" fmla="*/ 459 w 1645677"/>
+              <a:gd name="connsiteY1" fmla="*/ 3175 h 740859"/>
+              <a:gd name="connsiteX2" fmla="*/ 1212049 w 1645677"/>
+              <a:gd name="connsiteY2" fmla="*/ 0 h 740859"/>
+              <a:gd name="connsiteX3" fmla="*/ 1645677 w 1645677"/>
+              <a:gd name="connsiteY3" fmla="*/ 734763 h 740859"/>
+              <a:gd name="connsiteX4" fmla="*/ 3076 w 1645677"/>
+              <a:gd name="connsiteY4" fmla="*/ 740859 h 740859"/>
+              <a:gd name="connsiteX0" fmla="*/ 0 w 1642601"/>
+              <a:gd name="connsiteY0" fmla="*/ 740859 h 740859"/>
+              <a:gd name="connsiteX1" fmla="*/ 3733 w 1642601"/>
+              <a:gd name="connsiteY1" fmla="*/ 9525 h 740859"/>
+              <a:gd name="connsiteX2" fmla="*/ 1208973 w 1642601"/>
+              <a:gd name="connsiteY2" fmla="*/ 0 h 740859"/>
+              <a:gd name="connsiteX3" fmla="*/ 1642601 w 1642601"/>
+              <a:gd name="connsiteY3" fmla="*/ 734763 h 740859"/>
+              <a:gd name="connsiteX4" fmla="*/ 0 w 1642601"/>
+              <a:gd name="connsiteY4" fmla="*/ 740859 h 740859"/>
+              <a:gd name="connsiteX0" fmla="*/ 0 w 1661651"/>
+              <a:gd name="connsiteY0" fmla="*/ 740859 h 741113"/>
+              <a:gd name="connsiteX1" fmla="*/ 3733 w 1661651"/>
+              <a:gd name="connsiteY1" fmla="*/ 9525 h 741113"/>
+              <a:gd name="connsiteX2" fmla="*/ 1208973 w 1661651"/>
+              <a:gd name="connsiteY2" fmla="*/ 0 h 741113"/>
+              <a:gd name="connsiteX3" fmla="*/ 1661651 w 1661651"/>
+              <a:gd name="connsiteY3" fmla="*/ 741113 h 741113"/>
+              <a:gd name="connsiteX4" fmla="*/ 0 w 1661651"/>
+              <a:gd name="connsiteY4" fmla="*/ 740859 h 741113"/>
+              <a:gd name="connsiteX0" fmla="*/ 0 w 1661651"/>
+              <a:gd name="connsiteY0" fmla="*/ 744490 h 744744"/>
+              <a:gd name="connsiteX1" fmla="*/ 7099 w 1661651"/>
+              <a:gd name="connsiteY1" fmla="*/ 0 h 744744"/>
+              <a:gd name="connsiteX2" fmla="*/ 1208973 w 1661651"/>
+              <a:gd name="connsiteY2" fmla="*/ 3631 h 744744"/>
+              <a:gd name="connsiteX3" fmla="*/ 1661651 w 1661651"/>
+              <a:gd name="connsiteY3" fmla="*/ 744744 h 744744"/>
+              <a:gd name="connsiteX4" fmla="*/ 0 w 1661651"/>
+              <a:gd name="connsiteY4" fmla="*/ 744490 h 744744"/>
+              <a:gd name="connsiteX0" fmla="*/ 0 w 1661651"/>
+              <a:gd name="connsiteY0" fmla="*/ 744490 h 744744"/>
+              <a:gd name="connsiteX1" fmla="*/ 7099 w 1661651"/>
+              <a:gd name="connsiteY1" fmla="*/ 0 h 744744"/>
+              <a:gd name="connsiteX2" fmla="*/ 1103015 w 1661651"/>
+              <a:gd name="connsiteY2" fmla="*/ 3631 h 744744"/>
+              <a:gd name="connsiteX3" fmla="*/ 1661651 w 1661651"/>
+              <a:gd name="connsiteY3" fmla="*/ 744744 h 744744"/>
+              <a:gd name="connsiteX4" fmla="*/ 0 w 1661651"/>
+              <a:gd name="connsiteY4" fmla="*/ 744490 h 744744"/>
+              <a:gd name="connsiteX0" fmla="*/ 0 w 1661651"/>
+              <a:gd name="connsiteY0" fmla="*/ 744490 h 744744"/>
+              <a:gd name="connsiteX1" fmla="*/ 7099 w 1661651"/>
+              <a:gd name="connsiteY1" fmla="*/ 0 h 744744"/>
+              <a:gd name="connsiteX2" fmla="*/ 1121283 w 1661651"/>
+              <a:gd name="connsiteY2" fmla="*/ 6814 h 744744"/>
+              <a:gd name="connsiteX3" fmla="*/ 1661651 w 1661651"/>
+              <a:gd name="connsiteY3" fmla="*/ 744744 h 744744"/>
+              <a:gd name="connsiteX4" fmla="*/ 0 w 1661651"/>
+              <a:gd name="connsiteY4" fmla="*/ 744490 h 744744"/>
+              <a:gd name="connsiteX0" fmla="*/ 0 w 1672612"/>
+              <a:gd name="connsiteY0" fmla="*/ 744490 h 747926"/>
+              <a:gd name="connsiteX1" fmla="*/ 7099 w 1672612"/>
+              <a:gd name="connsiteY1" fmla="*/ 0 h 747926"/>
+              <a:gd name="connsiteX2" fmla="*/ 1121283 w 1672612"/>
+              <a:gd name="connsiteY2" fmla="*/ 6814 h 747926"/>
+              <a:gd name="connsiteX3" fmla="*/ 1672612 w 1672612"/>
+              <a:gd name="connsiteY3" fmla="*/ 747926 h 747926"/>
+              <a:gd name="connsiteX4" fmla="*/ 0 w 1672612"/>
+              <a:gd name="connsiteY4" fmla="*/ 744490 h 747926"/>
+              <a:gd name="connsiteX0" fmla="*/ 0 w 1627759"/>
+              <a:gd name="connsiteY0" fmla="*/ 744490 h 751699"/>
+              <a:gd name="connsiteX1" fmla="*/ 7099 w 1627759"/>
+              <a:gd name="connsiteY1" fmla="*/ 0 h 751699"/>
+              <a:gd name="connsiteX2" fmla="*/ 1121283 w 1627759"/>
+              <a:gd name="connsiteY2" fmla="*/ 6814 h 751699"/>
+              <a:gd name="connsiteX3" fmla="*/ 1627759 w 1627759"/>
+              <a:gd name="connsiteY3" fmla="*/ 751699 h 751699"/>
+              <a:gd name="connsiteX4" fmla="*/ 0 w 1627759"/>
+              <a:gd name="connsiteY4" fmla="*/ 744490 h 751699"/>
+              <a:gd name="connsiteX0" fmla="*/ 0 w 1627759"/>
+              <a:gd name="connsiteY0" fmla="*/ 744490 h 744490"/>
+              <a:gd name="connsiteX1" fmla="*/ 7099 w 1627759"/>
+              <a:gd name="connsiteY1" fmla="*/ 0 h 744490"/>
+              <a:gd name="connsiteX2" fmla="*/ 1121283 w 1627759"/>
+              <a:gd name="connsiteY2" fmla="*/ 6814 h 744490"/>
+              <a:gd name="connsiteX3" fmla="*/ 1627759 w 1627759"/>
+              <a:gd name="connsiteY3" fmla="*/ 740380 h 744490"/>
+              <a:gd name="connsiteX4" fmla="*/ 0 w 1627759"/>
+              <a:gd name="connsiteY4" fmla="*/ 744490 h 744490"/>
+              <a:gd name="connsiteX0" fmla="*/ 0 w 1631497"/>
+              <a:gd name="connsiteY0" fmla="*/ 744490 h 744490"/>
+              <a:gd name="connsiteX1" fmla="*/ 7099 w 1631497"/>
+              <a:gd name="connsiteY1" fmla="*/ 0 h 744490"/>
+              <a:gd name="connsiteX2" fmla="*/ 1121283 w 1631497"/>
+              <a:gd name="connsiteY2" fmla="*/ 6814 h 744490"/>
+              <a:gd name="connsiteX3" fmla="*/ 1631497 w 1631497"/>
+              <a:gd name="connsiteY3" fmla="*/ 744153 h 744490"/>
+              <a:gd name="connsiteX4" fmla="*/ 0 w 1631497"/>
+              <a:gd name="connsiteY4" fmla="*/ 744490 h 744490"/>
+              <a:gd name="connsiteX0" fmla="*/ 1001 w 1632498"/>
+              <a:gd name="connsiteY0" fmla="*/ 737676 h 737676"/>
+              <a:gd name="connsiteX1" fmla="*/ 624 w 1632498"/>
+              <a:gd name="connsiteY1" fmla="*/ 732 h 737676"/>
+              <a:gd name="connsiteX2" fmla="*/ 1122284 w 1632498"/>
+              <a:gd name="connsiteY2" fmla="*/ 0 h 737676"/>
+              <a:gd name="connsiteX3" fmla="*/ 1632498 w 1632498"/>
+              <a:gd name="connsiteY3" fmla="*/ 737339 h 737676"/>
+              <a:gd name="connsiteX4" fmla="*/ 1001 w 1632498"/>
+              <a:gd name="connsiteY4" fmla="*/ 737676 h 737676"/>
+              <a:gd name="connsiteX0" fmla="*/ 1001 w 1632498"/>
+              <a:gd name="connsiteY0" fmla="*/ 736944 h 736944"/>
+              <a:gd name="connsiteX1" fmla="*/ 624 w 1632498"/>
+              <a:gd name="connsiteY1" fmla="*/ 0 h 736944"/>
+              <a:gd name="connsiteX2" fmla="*/ 1133497 w 1632498"/>
+              <a:gd name="connsiteY2" fmla="*/ 6814 h 736944"/>
+              <a:gd name="connsiteX3" fmla="*/ 1632498 w 1632498"/>
+              <a:gd name="connsiteY3" fmla="*/ 736607 h 736944"/>
+              <a:gd name="connsiteX4" fmla="*/ 1001 w 1632498"/>
+              <a:gd name="connsiteY4" fmla="*/ 736944 h 736944"/>
+              <a:gd name="connsiteX0" fmla="*/ 1001 w 1632498"/>
+              <a:gd name="connsiteY0" fmla="*/ 736944 h 736944"/>
+              <a:gd name="connsiteX1" fmla="*/ 624 w 1632498"/>
+              <a:gd name="connsiteY1" fmla="*/ 0 h 736944"/>
+              <a:gd name="connsiteX2" fmla="*/ 1137235 w 1632498"/>
+              <a:gd name="connsiteY2" fmla="*/ 3041 h 736944"/>
+              <a:gd name="connsiteX3" fmla="*/ 1632498 w 1632498"/>
+              <a:gd name="connsiteY3" fmla="*/ 736607 h 736944"/>
+              <a:gd name="connsiteX4" fmla="*/ 1001 w 1632498"/>
+              <a:gd name="connsiteY4" fmla="*/ 736944 h 736944"/>
+              <a:gd name="connsiteX0" fmla="*/ 1001 w 1632498"/>
+              <a:gd name="connsiteY0" fmla="*/ 737230 h 737230"/>
+              <a:gd name="connsiteX1" fmla="*/ 624 w 1632498"/>
+              <a:gd name="connsiteY1" fmla="*/ 286 h 737230"/>
+              <a:gd name="connsiteX2" fmla="*/ 1137235 w 1632498"/>
+              <a:gd name="connsiteY2" fmla="*/ 0 h 737230"/>
+              <a:gd name="connsiteX3" fmla="*/ 1632498 w 1632498"/>
+              <a:gd name="connsiteY3" fmla="*/ 736893 h 737230"/>
+              <a:gd name="connsiteX4" fmla="*/ 1001 w 1632498"/>
+              <a:gd name="connsiteY4" fmla="*/ 737230 h 737230"/>
+              <a:gd name="connsiteX0" fmla="*/ 1001 w 1632498"/>
+              <a:gd name="connsiteY0" fmla="*/ 736944 h 736944"/>
+              <a:gd name="connsiteX1" fmla="*/ 624 w 1632498"/>
+              <a:gd name="connsiteY1" fmla="*/ 0 h 736944"/>
+              <a:gd name="connsiteX2" fmla="*/ 1133939 w 1632498"/>
+              <a:gd name="connsiteY2" fmla="*/ 3041 h 736944"/>
+              <a:gd name="connsiteX3" fmla="*/ 1632498 w 1632498"/>
+              <a:gd name="connsiteY3" fmla="*/ 736607 h 736944"/>
+              <a:gd name="connsiteX4" fmla="*/ 1001 w 1632498"/>
+              <a:gd name="connsiteY4" fmla="*/ 736944 h 736944"/>
+              <a:gd name="connsiteX0" fmla="*/ 1001 w 1632498"/>
+              <a:gd name="connsiteY0" fmla="*/ 736944 h 736944"/>
+              <a:gd name="connsiteX1" fmla="*/ 624 w 1632498"/>
+              <a:gd name="connsiteY1" fmla="*/ 0 h 736944"/>
+              <a:gd name="connsiteX2" fmla="*/ 1051353 w 1632498"/>
+              <a:gd name="connsiteY2" fmla="*/ 3041 h 736944"/>
+              <a:gd name="connsiteX3" fmla="*/ 1632498 w 1632498"/>
+              <a:gd name="connsiteY3" fmla="*/ 736607 h 736944"/>
+              <a:gd name="connsiteX4" fmla="*/ 1001 w 1632498"/>
+              <a:gd name="connsiteY4" fmla="*/ 736944 h 736944"/>
+              <a:gd name="connsiteX0" fmla="*/ 1001 w 1632498"/>
+              <a:gd name="connsiteY0" fmla="*/ 737230 h 737230"/>
+              <a:gd name="connsiteX1" fmla="*/ 624 w 1632498"/>
+              <a:gd name="connsiteY1" fmla="*/ 286 h 737230"/>
+              <a:gd name="connsiteX2" fmla="*/ 1043487 w 1632498"/>
+              <a:gd name="connsiteY2" fmla="*/ 0 h 737230"/>
+              <a:gd name="connsiteX3" fmla="*/ 1632498 w 1632498"/>
+              <a:gd name="connsiteY3" fmla="*/ 736893 h 737230"/>
+              <a:gd name="connsiteX4" fmla="*/ 1001 w 1632498"/>
+              <a:gd name="connsiteY4" fmla="*/ 737230 h 737230"/>
+              <a:gd name="connsiteX0" fmla="*/ 1001 w 1632498"/>
+              <a:gd name="connsiteY0" fmla="*/ 736944 h 736944"/>
+              <a:gd name="connsiteX1" fmla="*/ 624 w 1632498"/>
+              <a:gd name="connsiteY1" fmla="*/ 0 h 736944"/>
+              <a:gd name="connsiteX2" fmla="*/ 1039555 w 1632498"/>
+              <a:gd name="connsiteY2" fmla="*/ 3041 h 736944"/>
+              <a:gd name="connsiteX3" fmla="*/ 1632498 w 1632498"/>
+              <a:gd name="connsiteY3" fmla="*/ 736607 h 736944"/>
+              <a:gd name="connsiteX4" fmla="*/ 1001 w 1632498"/>
+              <a:gd name="connsiteY4" fmla="*/ 736944 h 736944"/>
+              <a:gd name="connsiteX0" fmla="*/ 0 w 1631497"/>
+              <a:gd name="connsiteY0" fmla="*/ 733903 h 733903"/>
+              <a:gd name="connsiteX1" fmla="*/ 3598 w 1631497"/>
+              <a:gd name="connsiteY1" fmla="*/ 3684 h 733903"/>
+              <a:gd name="connsiteX2" fmla="*/ 1038554 w 1631497"/>
+              <a:gd name="connsiteY2" fmla="*/ 0 h 733903"/>
+              <a:gd name="connsiteX3" fmla="*/ 1631497 w 1631497"/>
+              <a:gd name="connsiteY3" fmla="*/ 733566 h 733903"/>
+              <a:gd name="connsiteX4" fmla="*/ 0 w 1631497"/>
+              <a:gd name="connsiteY4" fmla="*/ 733903 h 733903"/>
+              <a:gd name="connsiteX0" fmla="*/ 0 w 1631497"/>
+              <a:gd name="connsiteY0" fmla="*/ 733903 h 733903"/>
+              <a:gd name="connsiteX1" fmla="*/ 7572 w 1631497"/>
+              <a:gd name="connsiteY1" fmla="*/ 322 h 733903"/>
+              <a:gd name="connsiteX2" fmla="*/ 1038554 w 1631497"/>
+              <a:gd name="connsiteY2" fmla="*/ 0 h 733903"/>
+              <a:gd name="connsiteX3" fmla="*/ 1631497 w 1631497"/>
+              <a:gd name="connsiteY3" fmla="*/ 733566 h 733903"/>
+              <a:gd name="connsiteX4" fmla="*/ 0 w 1631497"/>
+              <a:gd name="connsiteY4" fmla="*/ 733903 h 733903"/>
+            </a:gdLst>
+            <a:ahLst/>
+            <a:cxnLst>
+              <a:cxn ang="0">
+                <a:pos x="connsiteX0" y="connsiteY0"/>
+              </a:cxn>
+              <a:cxn ang="0">
+                <a:pos x="connsiteX1" y="connsiteY1"/>
+              </a:cxn>
+              <a:cxn ang="0">
+                <a:pos x="connsiteX2" y="connsiteY2"/>
+              </a:cxn>
+              <a:cxn ang="0">
+                <a:pos x="connsiteX3" y="connsiteY3"/>
+              </a:cxn>
+              <a:cxn ang="0">
+                <a:pos x="connsiteX4" y="connsiteY4"/>
+              </a:cxn>
+            </a:cxnLst>
+            <a:rect l="l" t="t" r="r" b="b"/>
+            <a:pathLst>
+              <a:path w="1631497" h="733903">
+                <a:moveTo>
+                  <a:pt x="0" y="733903"/>
+                </a:moveTo>
+                <a:cubicBezTo>
+                  <a:pt x="2303" y="486950"/>
+                  <a:pt x="5269" y="247275"/>
+                  <a:pt x="7572" y="322"/>
+                </a:cubicBezTo>
+                <a:lnTo>
+                  <a:pt x="1038554" y="0"/>
+                </a:lnTo>
+                <a:lnTo>
+                  <a:pt x="1631497" y="733566"/>
+                </a:lnTo>
+                <a:lnTo>
+                  <a:pt x="0" y="733903"/>
+                </a:lnTo>
+                <a:close/>
+              </a:path>
+            </a:pathLst>
+          </a:custGeom>
+          <a:solidFill>
+            <a:srgbClr val="E06665"/>
+          </a:solidFill>
+          <a:ln w="28575">
+            <a:solidFill>
+              <a:schemeClr val="bg1"/>
+            </a:solidFill>
+          </a:ln>
+        </p:spPr>
+        <p:style>
+          <a:lnRef idx="2">
+            <a:schemeClr val="accent1">
+              <a:shade val="50000"/>
+            </a:schemeClr>
+          </a:lnRef>
+          <a:fillRef idx="1">
+            <a:schemeClr val="accent1"/>
+          </a:fillRef>
+          <a:effectRef idx="0">
+            <a:schemeClr val="accent1"/>
+          </a:effectRef>
+          <a:fontRef idx="minor">
+            <a:schemeClr val="lt1"/>
+          </a:fontRef>
+        </p:style>
+        <p:txBody>
+          <a:bodyPr rtlCol="0" anchor="ctr"/>
+          <a:lstStyle/>
+          <a:p>
+            <a:pPr algn="ctr"/>
+            <a:endParaRPr lang="en-US"/>
+          </a:p>
+        </p:txBody>
+      </p:sp>
+      <p:sp>
+        <p:nvSpPr>
+          <p:cNvPr id="33" name="Trapezoid 16">
+            <a:extLst>
+              <a:ext uri="{FF2B5EF4-FFF2-40B4-BE49-F238E27FC236}">
+                <a16:creationId xmlns:a16="http://schemas.microsoft.com/office/drawing/2014/main" id="{7FF74609-09F9-294A-BA55-CC07B538A209}"/>
+              </a:ext>
+            </a:extLst>
+          </p:cNvPr>
+          <p:cNvSpPr/>
+          <p:nvPr/>
+        </p:nvSpPr>
+        <p:spPr>
+          <a:xfrm flipH="1">
+            <a:off x="3955676" y="2298709"/>
+            <a:ext cx="1320995" cy="700275"/>
+          </a:xfrm>
+          <a:custGeom>
+            <a:avLst/>
+            <a:gdLst>
+              <a:gd name="connsiteX0" fmla="*/ 0 w 1941305"/>
+              <a:gd name="connsiteY0" fmla="*/ 734763 h 734763"/>
+              <a:gd name="connsiteX1" fmla="*/ 433628 w 1941305"/>
+              <a:gd name="connsiteY1" fmla="*/ 0 h 734763"/>
+              <a:gd name="connsiteX2" fmla="*/ 1507677 w 1941305"/>
+              <a:gd name="connsiteY2" fmla="*/ 0 h 734763"/>
+              <a:gd name="connsiteX3" fmla="*/ 1941305 w 1941305"/>
+              <a:gd name="connsiteY3" fmla="*/ 734763 h 734763"/>
+              <a:gd name="connsiteX4" fmla="*/ 0 w 1941305"/>
+              <a:gd name="connsiteY4" fmla="*/ 734763 h 734763"/>
+              <a:gd name="connsiteX0" fmla="*/ 0 w 1642601"/>
+              <a:gd name="connsiteY0" fmla="*/ 740859 h 740859"/>
+              <a:gd name="connsiteX1" fmla="*/ 134924 w 1642601"/>
+              <a:gd name="connsiteY1" fmla="*/ 0 h 740859"/>
+              <a:gd name="connsiteX2" fmla="*/ 1208973 w 1642601"/>
+              <a:gd name="connsiteY2" fmla="*/ 0 h 740859"/>
+              <a:gd name="connsiteX3" fmla="*/ 1642601 w 1642601"/>
+              <a:gd name="connsiteY3" fmla="*/ 734763 h 740859"/>
+              <a:gd name="connsiteX4" fmla="*/ 0 w 1642601"/>
+              <a:gd name="connsiteY4" fmla="*/ 740859 h 740859"/>
+              <a:gd name="connsiteX0" fmla="*/ 0 w 1642601"/>
+              <a:gd name="connsiteY0" fmla="*/ 740859 h 740859"/>
+              <a:gd name="connsiteX1" fmla="*/ 13004 w 1642601"/>
+              <a:gd name="connsiteY1" fmla="*/ 0 h 740859"/>
+              <a:gd name="connsiteX2" fmla="*/ 1208973 w 1642601"/>
+              <a:gd name="connsiteY2" fmla="*/ 0 h 740859"/>
+              <a:gd name="connsiteX3" fmla="*/ 1642601 w 1642601"/>
+              <a:gd name="connsiteY3" fmla="*/ 734763 h 740859"/>
+              <a:gd name="connsiteX4" fmla="*/ 0 w 1642601"/>
+              <a:gd name="connsiteY4" fmla="*/ 740859 h 740859"/>
+              <a:gd name="connsiteX0" fmla="*/ 0 w 1642601"/>
+              <a:gd name="connsiteY0" fmla="*/ 740859 h 740859"/>
+              <a:gd name="connsiteX1" fmla="*/ 6908 w 1642601"/>
+              <a:gd name="connsiteY1" fmla="*/ 0 h 740859"/>
+              <a:gd name="connsiteX2" fmla="*/ 1208973 w 1642601"/>
+              <a:gd name="connsiteY2" fmla="*/ 0 h 740859"/>
+              <a:gd name="connsiteX3" fmla="*/ 1642601 w 1642601"/>
+              <a:gd name="connsiteY3" fmla="*/ 734763 h 740859"/>
+              <a:gd name="connsiteX4" fmla="*/ 0 w 1642601"/>
+              <a:gd name="connsiteY4" fmla="*/ 740859 h 740859"/>
+              <a:gd name="connsiteX0" fmla="*/ 3076 w 1645677"/>
+              <a:gd name="connsiteY0" fmla="*/ 740859 h 740859"/>
+              <a:gd name="connsiteX1" fmla="*/ 459 w 1645677"/>
+              <a:gd name="connsiteY1" fmla="*/ 3175 h 740859"/>
+              <a:gd name="connsiteX2" fmla="*/ 1212049 w 1645677"/>
+              <a:gd name="connsiteY2" fmla="*/ 0 h 740859"/>
+              <a:gd name="connsiteX3" fmla="*/ 1645677 w 1645677"/>
+              <a:gd name="connsiteY3" fmla="*/ 734763 h 740859"/>
+              <a:gd name="connsiteX4" fmla="*/ 3076 w 1645677"/>
+              <a:gd name="connsiteY4" fmla="*/ 740859 h 740859"/>
+              <a:gd name="connsiteX0" fmla="*/ 0 w 1642601"/>
+              <a:gd name="connsiteY0" fmla="*/ 740859 h 740859"/>
+              <a:gd name="connsiteX1" fmla="*/ 3733 w 1642601"/>
+              <a:gd name="connsiteY1" fmla="*/ 9525 h 740859"/>
+              <a:gd name="connsiteX2" fmla="*/ 1208973 w 1642601"/>
+              <a:gd name="connsiteY2" fmla="*/ 0 h 740859"/>
+              <a:gd name="connsiteX3" fmla="*/ 1642601 w 1642601"/>
+              <a:gd name="connsiteY3" fmla="*/ 734763 h 740859"/>
+              <a:gd name="connsiteX4" fmla="*/ 0 w 1642601"/>
+              <a:gd name="connsiteY4" fmla="*/ 740859 h 740859"/>
+              <a:gd name="connsiteX0" fmla="*/ 0 w 1661651"/>
+              <a:gd name="connsiteY0" fmla="*/ 740859 h 741113"/>
+              <a:gd name="connsiteX1" fmla="*/ 3733 w 1661651"/>
+              <a:gd name="connsiteY1" fmla="*/ 9525 h 741113"/>
+              <a:gd name="connsiteX2" fmla="*/ 1208973 w 1661651"/>
+              <a:gd name="connsiteY2" fmla="*/ 0 h 741113"/>
+              <a:gd name="connsiteX3" fmla="*/ 1661651 w 1661651"/>
+              <a:gd name="connsiteY3" fmla="*/ 741113 h 741113"/>
+              <a:gd name="connsiteX4" fmla="*/ 0 w 1661651"/>
+              <a:gd name="connsiteY4" fmla="*/ 740859 h 741113"/>
+              <a:gd name="connsiteX0" fmla="*/ 0 w 1661651"/>
+              <a:gd name="connsiteY0" fmla="*/ 744490 h 744744"/>
+              <a:gd name="connsiteX1" fmla="*/ 7099 w 1661651"/>
+              <a:gd name="connsiteY1" fmla="*/ 0 h 744744"/>
+              <a:gd name="connsiteX2" fmla="*/ 1208973 w 1661651"/>
+              <a:gd name="connsiteY2" fmla="*/ 3631 h 744744"/>
+              <a:gd name="connsiteX3" fmla="*/ 1661651 w 1661651"/>
+              <a:gd name="connsiteY3" fmla="*/ 744744 h 744744"/>
+              <a:gd name="connsiteX4" fmla="*/ 0 w 1661651"/>
+              <a:gd name="connsiteY4" fmla="*/ 744490 h 744744"/>
+              <a:gd name="connsiteX0" fmla="*/ 0 w 1661651"/>
+              <a:gd name="connsiteY0" fmla="*/ 744490 h 744744"/>
+              <a:gd name="connsiteX1" fmla="*/ 7099 w 1661651"/>
+              <a:gd name="connsiteY1" fmla="*/ 0 h 744744"/>
+              <a:gd name="connsiteX2" fmla="*/ 1103015 w 1661651"/>
+              <a:gd name="connsiteY2" fmla="*/ 3631 h 744744"/>
+              <a:gd name="connsiteX3" fmla="*/ 1661651 w 1661651"/>
+              <a:gd name="connsiteY3" fmla="*/ 744744 h 744744"/>
+              <a:gd name="connsiteX4" fmla="*/ 0 w 1661651"/>
+              <a:gd name="connsiteY4" fmla="*/ 744490 h 744744"/>
+              <a:gd name="connsiteX0" fmla="*/ 0 w 1661651"/>
+              <a:gd name="connsiteY0" fmla="*/ 744490 h 744744"/>
+              <a:gd name="connsiteX1" fmla="*/ 7099 w 1661651"/>
+              <a:gd name="connsiteY1" fmla="*/ 0 h 744744"/>
+              <a:gd name="connsiteX2" fmla="*/ 1121283 w 1661651"/>
+              <a:gd name="connsiteY2" fmla="*/ 6814 h 744744"/>
+              <a:gd name="connsiteX3" fmla="*/ 1661651 w 1661651"/>
+              <a:gd name="connsiteY3" fmla="*/ 744744 h 744744"/>
+              <a:gd name="connsiteX4" fmla="*/ 0 w 1661651"/>
+              <a:gd name="connsiteY4" fmla="*/ 744490 h 744744"/>
+              <a:gd name="connsiteX0" fmla="*/ 0 w 1672612"/>
+              <a:gd name="connsiteY0" fmla="*/ 744490 h 747926"/>
+              <a:gd name="connsiteX1" fmla="*/ 7099 w 1672612"/>
+              <a:gd name="connsiteY1" fmla="*/ 0 h 747926"/>
+              <a:gd name="connsiteX2" fmla="*/ 1121283 w 1672612"/>
+              <a:gd name="connsiteY2" fmla="*/ 6814 h 747926"/>
+              <a:gd name="connsiteX3" fmla="*/ 1672612 w 1672612"/>
+              <a:gd name="connsiteY3" fmla="*/ 747926 h 747926"/>
+              <a:gd name="connsiteX4" fmla="*/ 0 w 1672612"/>
+              <a:gd name="connsiteY4" fmla="*/ 744490 h 747926"/>
+              <a:gd name="connsiteX0" fmla="*/ 0 w 1627759"/>
+              <a:gd name="connsiteY0" fmla="*/ 744490 h 751699"/>
+              <a:gd name="connsiteX1" fmla="*/ 7099 w 1627759"/>
+              <a:gd name="connsiteY1" fmla="*/ 0 h 751699"/>
+              <a:gd name="connsiteX2" fmla="*/ 1121283 w 1627759"/>
+              <a:gd name="connsiteY2" fmla="*/ 6814 h 751699"/>
+              <a:gd name="connsiteX3" fmla="*/ 1627759 w 1627759"/>
+              <a:gd name="connsiteY3" fmla="*/ 751699 h 751699"/>
+              <a:gd name="connsiteX4" fmla="*/ 0 w 1627759"/>
+              <a:gd name="connsiteY4" fmla="*/ 744490 h 751699"/>
+              <a:gd name="connsiteX0" fmla="*/ 0 w 1627759"/>
+              <a:gd name="connsiteY0" fmla="*/ 744490 h 744490"/>
+              <a:gd name="connsiteX1" fmla="*/ 7099 w 1627759"/>
+              <a:gd name="connsiteY1" fmla="*/ 0 h 744490"/>
+              <a:gd name="connsiteX2" fmla="*/ 1121283 w 1627759"/>
+              <a:gd name="connsiteY2" fmla="*/ 6814 h 744490"/>
+              <a:gd name="connsiteX3" fmla="*/ 1627759 w 1627759"/>
+              <a:gd name="connsiteY3" fmla="*/ 740380 h 744490"/>
+              <a:gd name="connsiteX4" fmla="*/ 0 w 1627759"/>
+              <a:gd name="connsiteY4" fmla="*/ 744490 h 744490"/>
+              <a:gd name="connsiteX0" fmla="*/ 0 w 1631497"/>
+              <a:gd name="connsiteY0" fmla="*/ 744490 h 744490"/>
+              <a:gd name="connsiteX1" fmla="*/ 7099 w 1631497"/>
+              <a:gd name="connsiteY1" fmla="*/ 0 h 744490"/>
+              <a:gd name="connsiteX2" fmla="*/ 1121283 w 1631497"/>
+              <a:gd name="connsiteY2" fmla="*/ 6814 h 744490"/>
+              <a:gd name="connsiteX3" fmla="*/ 1631497 w 1631497"/>
+              <a:gd name="connsiteY3" fmla="*/ 744153 h 744490"/>
+              <a:gd name="connsiteX4" fmla="*/ 0 w 1631497"/>
+              <a:gd name="connsiteY4" fmla="*/ 744490 h 744490"/>
+              <a:gd name="connsiteX0" fmla="*/ 1001 w 1632498"/>
+              <a:gd name="connsiteY0" fmla="*/ 737676 h 737676"/>
+              <a:gd name="connsiteX1" fmla="*/ 624 w 1632498"/>
+              <a:gd name="connsiteY1" fmla="*/ 732 h 737676"/>
+              <a:gd name="connsiteX2" fmla="*/ 1122284 w 1632498"/>
+              <a:gd name="connsiteY2" fmla="*/ 0 h 737676"/>
+              <a:gd name="connsiteX3" fmla="*/ 1632498 w 1632498"/>
+              <a:gd name="connsiteY3" fmla="*/ 737339 h 737676"/>
+              <a:gd name="connsiteX4" fmla="*/ 1001 w 1632498"/>
+              <a:gd name="connsiteY4" fmla="*/ 737676 h 737676"/>
+              <a:gd name="connsiteX0" fmla="*/ 1001 w 1632498"/>
+              <a:gd name="connsiteY0" fmla="*/ 736944 h 736944"/>
+              <a:gd name="connsiteX1" fmla="*/ 624 w 1632498"/>
+              <a:gd name="connsiteY1" fmla="*/ 0 h 736944"/>
+              <a:gd name="connsiteX2" fmla="*/ 1133497 w 1632498"/>
+              <a:gd name="connsiteY2" fmla="*/ 6814 h 736944"/>
+              <a:gd name="connsiteX3" fmla="*/ 1632498 w 1632498"/>
+              <a:gd name="connsiteY3" fmla="*/ 736607 h 736944"/>
+              <a:gd name="connsiteX4" fmla="*/ 1001 w 1632498"/>
+              <a:gd name="connsiteY4" fmla="*/ 736944 h 736944"/>
+              <a:gd name="connsiteX0" fmla="*/ 1001 w 1632498"/>
+              <a:gd name="connsiteY0" fmla="*/ 736944 h 736944"/>
+              <a:gd name="connsiteX1" fmla="*/ 624 w 1632498"/>
+              <a:gd name="connsiteY1" fmla="*/ 0 h 736944"/>
+              <a:gd name="connsiteX2" fmla="*/ 1137235 w 1632498"/>
+              <a:gd name="connsiteY2" fmla="*/ 3041 h 736944"/>
+              <a:gd name="connsiteX3" fmla="*/ 1632498 w 1632498"/>
+              <a:gd name="connsiteY3" fmla="*/ 736607 h 736944"/>
+              <a:gd name="connsiteX4" fmla="*/ 1001 w 1632498"/>
+              <a:gd name="connsiteY4" fmla="*/ 736944 h 736944"/>
+              <a:gd name="connsiteX0" fmla="*/ 1001 w 1632498"/>
+              <a:gd name="connsiteY0" fmla="*/ 737230 h 737230"/>
+              <a:gd name="connsiteX1" fmla="*/ 624 w 1632498"/>
+              <a:gd name="connsiteY1" fmla="*/ 286 h 737230"/>
+              <a:gd name="connsiteX2" fmla="*/ 1137235 w 1632498"/>
+              <a:gd name="connsiteY2" fmla="*/ 0 h 737230"/>
+              <a:gd name="connsiteX3" fmla="*/ 1632498 w 1632498"/>
+              <a:gd name="connsiteY3" fmla="*/ 736893 h 737230"/>
+              <a:gd name="connsiteX4" fmla="*/ 1001 w 1632498"/>
+              <a:gd name="connsiteY4" fmla="*/ 737230 h 737230"/>
+              <a:gd name="connsiteX0" fmla="*/ 1001 w 1632498"/>
+              <a:gd name="connsiteY0" fmla="*/ 736944 h 736944"/>
+              <a:gd name="connsiteX1" fmla="*/ 624 w 1632498"/>
+              <a:gd name="connsiteY1" fmla="*/ 0 h 736944"/>
+              <a:gd name="connsiteX2" fmla="*/ 1133939 w 1632498"/>
+              <a:gd name="connsiteY2" fmla="*/ 3041 h 736944"/>
+              <a:gd name="connsiteX3" fmla="*/ 1632498 w 1632498"/>
+              <a:gd name="connsiteY3" fmla="*/ 736607 h 736944"/>
+              <a:gd name="connsiteX4" fmla="*/ 1001 w 1632498"/>
+              <a:gd name="connsiteY4" fmla="*/ 736944 h 736944"/>
+              <a:gd name="connsiteX0" fmla="*/ 1001 w 1632498"/>
+              <a:gd name="connsiteY0" fmla="*/ 736944 h 736944"/>
+              <a:gd name="connsiteX1" fmla="*/ 624 w 1632498"/>
+              <a:gd name="connsiteY1" fmla="*/ 0 h 736944"/>
+              <a:gd name="connsiteX2" fmla="*/ 1051353 w 1632498"/>
+              <a:gd name="connsiteY2" fmla="*/ 3041 h 736944"/>
+              <a:gd name="connsiteX3" fmla="*/ 1632498 w 1632498"/>
+              <a:gd name="connsiteY3" fmla="*/ 736607 h 736944"/>
+              <a:gd name="connsiteX4" fmla="*/ 1001 w 1632498"/>
+              <a:gd name="connsiteY4" fmla="*/ 736944 h 736944"/>
+              <a:gd name="connsiteX0" fmla="*/ 1001 w 1632498"/>
+              <a:gd name="connsiteY0" fmla="*/ 737230 h 737230"/>
+              <a:gd name="connsiteX1" fmla="*/ 624 w 1632498"/>
+              <a:gd name="connsiteY1" fmla="*/ 286 h 737230"/>
+              <a:gd name="connsiteX2" fmla="*/ 1043487 w 1632498"/>
+              <a:gd name="connsiteY2" fmla="*/ 0 h 737230"/>
+              <a:gd name="connsiteX3" fmla="*/ 1632498 w 1632498"/>
+              <a:gd name="connsiteY3" fmla="*/ 736893 h 737230"/>
+              <a:gd name="connsiteX4" fmla="*/ 1001 w 1632498"/>
+              <a:gd name="connsiteY4" fmla="*/ 737230 h 737230"/>
+              <a:gd name="connsiteX0" fmla="*/ 1001 w 1632498"/>
+              <a:gd name="connsiteY0" fmla="*/ 736944 h 736944"/>
+              <a:gd name="connsiteX1" fmla="*/ 624 w 1632498"/>
+              <a:gd name="connsiteY1" fmla="*/ 0 h 736944"/>
+              <a:gd name="connsiteX2" fmla="*/ 1039555 w 1632498"/>
+              <a:gd name="connsiteY2" fmla="*/ 3041 h 736944"/>
+              <a:gd name="connsiteX3" fmla="*/ 1632498 w 1632498"/>
+              <a:gd name="connsiteY3" fmla="*/ 736607 h 736944"/>
+              <a:gd name="connsiteX4" fmla="*/ 1001 w 1632498"/>
+              <a:gd name="connsiteY4" fmla="*/ 736944 h 736944"/>
+              <a:gd name="connsiteX0" fmla="*/ 4734 w 1636231"/>
+              <a:gd name="connsiteY0" fmla="*/ 733903 h 733903"/>
+              <a:gd name="connsiteX1" fmla="*/ 382 w 1636231"/>
+              <a:gd name="connsiteY1" fmla="*/ 322 h 733903"/>
+              <a:gd name="connsiteX2" fmla="*/ 1043288 w 1636231"/>
+              <a:gd name="connsiteY2" fmla="*/ 0 h 733903"/>
+              <a:gd name="connsiteX3" fmla="*/ 1636231 w 1636231"/>
+              <a:gd name="connsiteY3" fmla="*/ 733566 h 733903"/>
+              <a:gd name="connsiteX4" fmla="*/ 4734 w 1636231"/>
+              <a:gd name="connsiteY4" fmla="*/ 733903 h 733903"/>
+            </a:gdLst>
+            <a:ahLst/>
+            <a:cxnLst>
+              <a:cxn ang="0">
+                <a:pos x="connsiteX0" y="connsiteY0"/>
+              </a:cxn>
+              <a:cxn ang="0">
+                <a:pos x="connsiteX1" y="connsiteY1"/>
+              </a:cxn>
+              <a:cxn ang="0">
+                <a:pos x="connsiteX2" y="connsiteY2"/>
+              </a:cxn>
+              <a:cxn ang="0">
+                <a:pos x="connsiteX3" y="connsiteY3"/>
+              </a:cxn>
+              <a:cxn ang="0">
+                <a:pos x="connsiteX4" y="connsiteY4"/>
+              </a:cxn>
+            </a:cxnLst>
+            <a:rect l="l" t="t" r="r" b="b"/>
+            <a:pathLst>
+              <a:path w="1636231" h="733903">
+                <a:moveTo>
+                  <a:pt x="4734" y="733903"/>
+                </a:moveTo>
+                <a:cubicBezTo>
+                  <a:pt x="7037" y="486950"/>
+                  <a:pt x="-1921" y="247275"/>
+                  <a:pt x="382" y="322"/>
+                </a:cubicBezTo>
+                <a:lnTo>
+                  <a:pt x="1043288" y="0"/>
+                </a:lnTo>
+                <a:lnTo>
+                  <a:pt x="1636231" y="733566"/>
+                </a:lnTo>
+                <a:lnTo>
+                  <a:pt x="4734" y="733903"/>
+                </a:lnTo>
+                <a:close/>
+              </a:path>
+            </a:pathLst>
+          </a:custGeom>
+          <a:solidFill>
+            <a:srgbClr val="8F8F8F"/>
+          </a:solidFill>
+          <a:ln w="28575">
+            <a:solidFill>
+              <a:schemeClr val="bg1"/>
+            </a:solidFill>
+          </a:ln>
+        </p:spPr>
+        <p:style>
+          <a:lnRef idx="2">
+            <a:schemeClr val="accent1">
+              <a:shade val="50000"/>
+            </a:schemeClr>
+          </a:lnRef>
+          <a:fillRef idx="1">
+            <a:schemeClr val="accent1"/>
+          </a:fillRef>
+          <a:effectRef idx="0">
+            <a:schemeClr val="accent1"/>
+          </a:effectRef>
+          <a:fontRef idx="minor">
+            <a:schemeClr val="lt1"/>
+          </a:fontRef>
+        </p:style>
+        <p:txBody>
+          <a:bodyPr rtlCol="0" anchor="ctr"/>
+          <a:lstStyle/>
+          <a:p>
+            <a:pPr algn="ctr"/>
+            <a:endParaRPr lang="en-US"/>
+          </a:p>
+        </p:txBody>
+      </p:sp>
+      <p:sp>
+        <p:nvSpPr>
+          <p:cNvPr id="26" name="Rounded Rectangle 25">
+            <a:extLst>
+              <a:ext uri="{FF2B5EF4-FFF2-40B4-BE49-F238E27FC236}">
+                <a16:creationId xmlns:a16="http://schemas.microsoft.com/office/drawing/2014/main" id="{3D52989D-0DDB-3C4A-8EB0-E2F1718ABB30}"/>
+              </a:ext>
+            </a:extLst>
+          </p:cNvPr>
+          <p:cNvSpPr/>
+          <p:nvPr/>
+        </p:nvSpPr>
+        <p:spPr>
+          <a:xfrm>
+            <a:off x="1085337" y="2408571"/>
+            <a:ext cx="3967318" cy="468076"/>
+          </a:xfrm>
+          <a:prstGeom prst="roundRect">
+            <a:avLst/>
+          </a:prstGeom>
+          <a:solidFill>
+            <a:srgbClr val="8F8F8F"/>
+          </a:solidFill>
+          <a:ln w="28575">
+            <a:solidFill>
+              <a:schemeClr val="bg1"/>
+            </a:solidFill>
+          </a:ln>
+        </p:spPr>
+        <p:style>
+          <a:lnRef idx="2">
+            <a:schemeClr val="accent1">
+              <a:shade val="50000"/>
+            </a:schemeClr>
+          </a:lnRef>
+          <a:fillRef idx="1">
+            <a:schemeClr val="accent1"/>
+          </a:fillRef>
+          <a:effectRef idx="0">
+            <a:schemeClr val="accent1"/>
+          </a:effectRef>
+          <a:fontRef idx="minor">
+            <a:schemeClr val="lt1"/>
+          </a:fontRef>
+        </p:style>
+        <p:txBody>
+          <a:bodyPr rtlCol="0" anchor="ctr"/>
+          <a:lstStyle/>
+          <a:p>
+            <a:pPr marL="744538" indent="-733425"/>
+            <a:r>
+              <a:rPr lang="en-US" sz="1400" b="1" dirty="0">
+                <a:solidFill>
+                  <a:schemeClr val="bg1"/>
+                </a:solidFill>
+                <a:effectLst>
+                  <a:outerShdw blurRad="50800" dist="38100" dir="2700000" algn="tl" rotWithShape="0">
+                    <a:prstClr val="black">
+                      <a:alpha val="40000"/>
+                    </a:prstClr>
+                  </a:outerShdw>
+                </a:effectLst>
+                <a:latin typeface="Arial" panose="020B0604020202020204" pitchFamily="34" charset="0"/>
+                <a:cs typeface="Arial" panose="020B0604020202020204" pitchFamily="34" charset="0"/>
+              </a:rPr>
+              <a:t>Community Tools: </a:t>
+            </a:r>
+            <a:r>
+              <a:rPr lang="en-US" sz="1400" dirty="0">
+                <a:solidFill>
+                  <a:schemeClr val="bg1"/>
+                </a:solidFill>
+                <a:latin typeface="Arial" panose="020B0604020202020204" pitchFamily="34" charset="0"/>
+                <a:cs typeface="Arial" panose="020B0604020202020204" pitchFamily="34" charset="0"/>
+              </a:rPr>
+              <a:t>Data analysis, visualization and management tools for NWB</a:t>
+            </a:r>
+          </a:p>
+        </p:txBody>
+      </p:sp>
+      <p:sp>
+        <p:nvSpPr>
+          <p:cNvPr id="8" name="Rounded Rectangle 7">
+            <a:extLst>
+              <a:ext uri="{FF2B5EF4-FFF2-40B4-BE49-F238E27FC236}">
+                <a16:creationId xmlns:a16="http://schemas.microsoft.com/office/drawing/2014/main" id="{8CA41DA2-784D-D647-801B-6D345ECF97DF}"/>
+              </a:ext>
+            </a:extLst>
+          </p:cNvPr>
+          <p:cNvSpPr/>
+          <p:nvPr/>
+        </p:nvSpPr>
+        <p:spPr>
+          <a:xfrm>
+            <a:off x="5480019" y="864237"/>
+            <a:ext cx="4543553" cy="510149"/>
+          </a:xfrm>
+          <a:prstGeom prst="roundRect">
+            <a:avLst/>
+          </a:prstGeom>
+          <a:solidFill>
+            <a:srgbClr val="104B7C"/>
+          </a:solidFill>
+          <a:ln w="28575">
+            <a:solidFill>
+              <a:schemeClr val="bg1"/>
+            </a:solidFill>
+          </a:ln>
+        </p:spPr>
+        <p:style>
+          <a:lnRef idx="2">
+            <a:schemeClr val="accent1">
+              <a:shade val="50000"/>
+            </a:schemeClr>
+          </a:lnRef>
+          <a:fillRef idx="1">
+            <a:schemeClr val="accent1"/>
+          </a:fillRef>
+          <a:effectRef idx="0">
+            <a:schemeClr val="accent1"/>
+          </a:effectRef>
+          <a:fontRef idx="minor">
+            <a:schemeClr val="lt1"/>
+          </a:fontRef>
+        </p:style>
+        <p:txBody>
+          <a:bodyPr rtlCol="0" anchor="ctr"/>
+          <a:lstStyle/>
+          <a:p>
+            <a:pPr marL="860425" indent="-855663"/>
+            <a:r>
+              <a:rPr lang="en-US" sz="1400" b="1" dirty="0" err="1">
+                <a:effectLst>
+                  <a:outerShdw blurRad="50800" dist="38100" dir="2700000" algn="tl" rotWithShape="0">
+                    <a:prstClr val="black">
+                      <a:alpha val="40000"/>
+                    </a:prstClr>
+                  </a:outerShdw>
+                </a:effectLst>
+                <a:latin typeface="Arial" panose="020B0604020202020204" pitchFamily="34" charset="0"/>
+                <a:cs typeface="Arial" panose="020B0604020202020204" pitchFamily="34" charset="0"/>
+              </a:rPr>
+              <a:t>NWB.org</a:t>
+            </a:r>
+            <a:r>
+              <a:rPr lang="en-US" sz="1400" b="1" dirty="0">
+                <a:latin typeface="Arial" panose="020B0604020202020204" pitchFamily="34" charset="0"/>
+                <a:cs typeface="Arial" panose="020B0604020202020204" pitchFamily="34" charset="0"/>
+              </a:rPr>
+              <a:t>: </a:t>
+            </a:r>
+            <a:r>
+              <a:rPr lang="en-US" sz="1400" dirty="0">
+                <a:latin typeface="Arial" panose="020B0604020202020204" pitchFamily="34" charset="0"/>
+                <a:cs typeface="Arial" panose="020B0604020202020204" pitchFamily="34" charset="0"/>
+              </a:rPr>
+              <a:t>Overview of the NWB project, organization, community, news, and policies</a:t>
+            </a:r>
+          </a:p>
+        </p:txBody>
+      </p:sp>
+      <p:sp>
+        <p:nvSpPr>
+          <p:cNvPr id="10" name="Rounded Rectangle 9">
+            <a:extLst>
+              <a:ext uri="{FF2B5EF4-FFF2-40B4-BE49-F238E27FC236}">
+                <a16:creationId xmlns:a16="http://schemas.microsoft.com/office/drawing/2014/main" id="{54B4DF0A-F504-DB43-A475-C22A8C8B614A}"/>
+              </a:ext>
+            </a:extLst>
+          </p:cNvPr>
+          <p:cNvSpPr/>
+          <p:nvPr/>
+        </p:nvSpPr>
+        <p:spPr>
+          <a:xfrm>
+            <a:off x="5595991" y="1620579"/>
+            <a:ext cx="4543553" cy="539754"/>
+          </a:xfrm>
+          <a:prstGeom prst="roundRect">
+            <a:avLst/>
+          </a:prstGeom>
+          <a:solidFill>
+            <a:schemeClr val="tx1"/>
+          </a:solidFill>
+          <a:ln w="28575">
+            <a:solidFill>
+              <a:schemeClr val="bg1"/>
+            </a:solidFill>
+          </a:ln>
+        </p:spPr>
+        <p:style>
+          <a:lnRef idx="2">
+            <a:schemeClr val="accent1">
+              <a:shade val="50000"/>
+            </a:schemeClr>
+          </a:lnRef>
+          <a:fillRef idx="1">
+            <a:schemeClr val="accent1"/>
+          </a:fillRef>
+          <a:effectRef idx="0">
+            <a:schemeClr val="accent1"/>
+          </a:effectRef>
+          <a:fontRef idx="minor">
+            <a:schemeClr val="lt1"/>
+          </a:fontRef>
+        </p:style>
+        <p:txBody>
+          <a:bodyPr rtlCol="0" anchor="ctr"/>
+          <a:lstStyle/>
+          <a:p>
+            <a:pPr marL="1373188" indent="-1373188"/>
+            <a:r>
+              <a:rPr lang="en-US" sz="1400" b="1" dirty="0">
+                <a:solidFill>
+                  <a:schemeClr val="bg1"/>
+                </a:solidFill>
+                <a:effectLst>
+                  <a:outerShdw blurRad="50800" dist="38100" dir="2700000" algn="tl" rotWithShape="0">
+                    <a:prstClr val="black">
+                      <a:alpha val="40000"/>
+                    </a:prstClr>
+                  </a:outerShdw>
+                </a:effectLst>
+                <a:latin typeface="Arial" panose="020B0604020202020204" pitchFamily="34" charset="0"/>
+                <a:cs typeface="Arial" panose="020B0604020202020204" pitchFamily="34" charset="0"/>
+              </a:rPr>
+              <a:t>NWB Overview:</a:t>
+            </a:r>
+            <a:r>
+              <a:rPr lang="en-US" sz="1400" b="1" dirty="0">
+                <a:solidFill>
+                  <a:schemeClr val="tx1"/>
+                </a:solidFill>
+                <a:effectLst>
+                  <a:outerShdw blurRad="50800" dist="38100" dir="2700000" algn="tl" rotWithShape="0">
+                    <a:prstClr val="black">
+                      <a:alpha val="40000"/>
+                    </a:prstClr>
+                  </a:outerShdw>
+                </a:effectLst>
+                <a:latin typeface="Arial" panose="020B0604020202020204" pitchFamily="34" charset="0"/>
+                <a:cs typeface="Arial" panose="020B0604020202020204" pitchFamily="34" charset="0"/>
+              </a:rPr>
+              <a:t> </a:t>
+            </a:r>
+            <a:r>
+              <a:rPr lang="en-US" sz="1400" dirty="0">
+                <a:solidFill>
+                  <a:schemeClr val="bg1"/>
+                </a:solidFill>
+                <a:latin typeface="Arial" panose="020B0604020202020204" pitchFamily="34" charset="0"/>
+                <a:cs typeface="Arial" panose="020B0604020202020204" pitchFamily="34" charset="0"/>
+              </a:rPr>
+              <a:t>Entry point for users and developers to the NWB software ecosystem</a:t>
+            </a:r>
+          </a:p>
+        </p:txBody>
+      </p:sp>
+      <p:sp>
+        <p:nvSpPr>
+          <p:cNvPr id="15" name="Rounded Rectangle 14">
+            <a:extLst>
+              <a:ext uri="{FF2B5EF4-FFF2-40B4-BE49-F238E27FC236}">
+                <a16:creationId xmlns:a16="http://schemas.microsoft.com/office/drawing/2014/main" id="{14BDAFDB-E20A-F84B-A182-4F4F51E8ED1F}"/>
+              </a:ext>
+            </a:extLst>
+          </p:cNvPr>
+          <p:cNvSpPr/>
+          <p:nvPr/>
+        </p:nvSpPr>
+        <p:spPr>
+          <a:xfrm>
+            <a:off x="5923109" y="3770115"/>
+            <a:ext cx="4389605" cy="469594"/>
+          </a:xfrm>
+          <a:prstGeom prst="roundRect">
+            <a:avLst/>
+          </a:prstGeom>
+          <a:solidFill>
+            <a:srgbClr val="F7B26B"/>
+          </a:solidFill>
+          <a:ln w="28575">
+            <a:solidFill>
+              <a:schemeClr val="bg1"/>
+            </a:solidFill>
+          </a:ln>
+        </p:spPr>
+        <p:style>
+          <a:lnRef idx="2">
+            <a:schemeClr val="accent1">
+              <a:shade val="50000"/>
+            </a:schemeClr>
+          </a:lnRef>
+          <a:fillRef idx="1">
+            <a:schemeClr val="accent1"/>
+          </a:fillRef>
+          <a:effectRef idx="0">
+            <a:schemeClr val="accent1"/>
+          </a:effectRef>
+          <a:fontRef idx="minor">
+            <a:schemeClr val="lt1"/>
+          </a:fontRef>
+        </p:style>
+        <p:txBody>
+          <a:bodyPr rtlCol="0" anchor="ctr"/>
+          <a:lstStyle/>
+          <a:p>
+            <a:pPr marL="1314450" indent="-1309688"/>
+            <a:r>
+              <a:rPr lang="en-US" sz="1400" b="1" dirty="0">
+                <a:solidFill>
+                  <a:schemeClr val="bg1"/>
+                </a:solidFill>
+                <a:effectLst>
+                  <a:outerShdw blurRad="50800" dist="38100" dir="2700000" algn="tl" rotWithShape="0">
+                    <a:prstClr val="black">
+                      <a:alpha val="40000"/>
+                    </a:prstClr>
+                  </a:outerShdw>
+                </a:effectLst>
+                <a:latin typeface="Arial" panose="020B0604020202020204" pitchFamily="34" charset="0"/>
+                <a:cs typeface="Arial" panose="020B0604020202020204" pitchFamily="34" charset="0"/>
+              </a:rPr>
+              <a:t>Data Standard: </a:t>
+            </a:r>
+            <a:r>
+              <a:rPr lang="en-US" sz="1400" dirty="0">
+                <a:solidFill>
+                  <a:schemeClr val="bg1"/>
+                </a:solidFill>
+                <a:latin typeface="Arial" panose="020B0604020202020204" pitchFamily="34" charset="0"/>
+                <a:cs typeface="Arial" panose="020B0604020202020204" pitchFamily="34" charset="0"/>
+              </a:rPr>
+              <a:t>Schema and documentation that formally define the NWB standard</a:t>
+            </a:r>
+          </a:p>
+        </p:txBody>
+      </p:sp>
+      <p:sp>
+        <p:nvSpPr>
+          <p:cNvPr id="24" name="Rounded Rectangle 23">
+            <a:extLst>
+              <a:ext uri="{FF2B5EF4-FFF2-40B4-BE49-F238E27FC236}">
+                <a16:creationId xmlns:a16="http://schemas.microsoft.com/office/drawing/2014/main" id="{10E3D20B-5F7A-3347-9969-110A52843BA5}"/>
+              </a:ext>
+            </a:extLst>
+          </p:cNvPr>
+          <p:cNvSpPr/>
+          <p:nvPr/>
+        </p:nvSpPr>
+        <p:spPr>
+          <a:xfrm>
+            <a:off x="5923109" y="2409136"/>
+            <a:ext cx="4389605" cy="468076"/>
+          </a:xfrm>
+          <a:prstGeom prst="roundRect">
+            <a:avLst/>
+          </a:prstGeom>
+          <a:solidFill>
+            <a:srgbClr val="E06665"/>
+          </a:solidFill>
+          <a:ln w="28575">
+            <a:solidFill>
+              <a:schemeClr val="bg1"/>
+            </a:solidFill>
+          </a:ln>
+        </p:spPr>
+        <p:style>
+          <a:lnRef idx="2">
+            <a:schemeClr val="accent1">
+              <a:shade val="50000"/>
+            </a:schemeClr>
+          </a:lnRef>
+          <a:fillRef idx="1">
+            <a:schemeClr val="accent1"/>
+          </a:fillRef>
+          <a:effectRef idx="0">
+            <a:schemeClr val="accent1"/>
+          </a:effectRef>
+          <a:fontRef idx="minor">
+            <a:schemeClr val="lt1"/>
+          </a:fontRef>
+        </p:style>
+        <p:txBody>
+          <a:bodyPr rtlCol="0" anchor="ctr"/>
+          <a:lstStyle/>
+          <a:p>
+            <a:pPr marL="1085850" indent="-1074738"/>
+            <a:r>
+              <a:rPr lang="en-US" sz="1400" b="1" dirty="0">
+                <a:solidFill>
+                  <a:schemeClr val="bg1"/>
+                </a:solidFill>
+                <a:effectLst>
+                  <a:outerShdw blurRad="50800" dist="38100" dir="2700000" algn="tl" rotWithShape="0">
+                    <a:prstClr val="black">
+                      <a:alpha val="40000"/>
+                    </a:prstClr>
+                  </a:outerShdw>
+                </a:effectLst>
+                <a:latin typeface="Arial" panose="020B0604020202020204" pitchFamily="34" charset="0"/>
+                <a:cs typeface="Arial" panose="020B0604020202020204" pitchFamily="34" charset="0"/>
+              </a:rPr>
+              <a:t>NWB Tools: </a:t>
+            </a:r>
+            <a:r>
+              <a:rPr lang="en-US" sz="1400" dirty="0">
+                <a:solidFill>
+                  <a:schemeClr val="bg1"/>
+                </a:solidFill>
+                <a:latin typeface="Arial" panose="020B0604020202020204" pitchFamily="34" charset="0"/>
+                <a:cs typeface="Arial" panose="020B0604020202020204" pitchFamily="34" charset="0"/>
+              </a:rPr>
+              <a:t>Tools for data conversion, extension, validation, and use </a:t>
+            </a:r>
+          </a:p>
+        </p:txBody>
+      </p:sp>
+      <p:sp>
+        <p:nvSpPr>
+          <p:cNvPr id="13" name="Rounded Rectangle 12">
+            <a:extLst>
+              <a:ext uri="{FF2B5EF4-FFF2-40B4-BE49-F238E27FC236}">
+                <a16:creationId xmlns:a16="http://schemas.microsoft.com/office/drawing/2014/main" id="{E84B53CD-C49A-4A40-B4A0-DEF7A5C35B24}"/>
+              </a:ext>
+            </a:extLst>
+          </p:cNvPr>
+          <p:cNvSpPr/>
+          <p:nvPr/>
+        </p:nvSpPr>
+        <p:spPr>
+          <a:xfrm>
+            <a:off x="5923109" y="3127182"/>
+            <a:ext cx="2961473" cy="383115"/>
+          </a:xfrm>
+          <a:prstGeom prst="roundRect">
+            <a:avLst/>
+          </a:prstGeom>
+          <a:solidFill>
+            <a:srgbClr val="9C83BB"/>
+          </a:solidFill>
+          <a:ln w="28575">
+            <a:solidFill>
+              <a:schemeClr val="bg1"/>
+            </a:solidFill>
+          </a:ln>
+        </p:spPr>
+        <p:style>
+          <a:lnRef idx="2">
+            <a:schemeClr val="accent1">
+              <a:shade val="50000"/>
+            </a:schemeClr>
+          </a:lnRef>
+          <a:fillRef idx="1">
+            <a:schemeClr val="accent1"/>
+          </a:fillRef>
+          <a:effectRef idx="0">
+            <a:schemeClr val="accent1"/>
+          </a:effectRef>
+          <a:fontRef idx="minor">
+            <a:schemeClr val="lt1"/>
+          </a:fontRef>
+        </p:style>
+        <p:txBody>
+          <a:bodyPr rtlCol="0" anchor="ctr"/>
+          <a:lstStyle/>
+          <a:p>
+            <a:r>
+              <a:rPr lang="en-US" sz="1400" b="1" dirty="0">
+                <a:solidFill>
+                  <a:schemeClr val="bg1"/>
+                </a:solidFill>
+                <a:effectLst>
+                  <a:outerShdw blurRad="50800" dist="38100" dir="2700000" algn="tl" rotWithShape="0">
+                    <a:prstClr val="black">
+                      <a:alpha val="40000"/>
+                    </a:prstClr>
+                  </a:outerShdw>
+                </a:effectLst>
+                <a:latin typeface="Arial" panose="020B0604020202020204" pitchFamily="34" charset="0"/>
+                <a:cs typeface="Arial" panose="020B0604020202020204" pitchFamily="34" charset="0"/>
+              </a:rPr>
+              <a:t>Data APIs: </a:t>
+            </a:r>
+            <a:r>
+              <a:rPr lang="en-US" sz="1400" dirty="0" err="1">
+                <a:solidFill>
+                  <a:schemeClr val="bg1"/>
+                </a:solidFill>
+                <a:latin typeface="Arial" panose="020B0604020202020204" pitchFamily="34" charset="0"/>
+                <a:cs typeface="Arial" panose="020B0604020202020204" pitchFamily="34" charset="0"/>
+              </a:rPr>
+              <a:t>PyNWB</a:t>
+            </a:r>
+            <a:r>
+              <a:rPr lang="en-US" sz="1400" dirty="0">
+                <a:solidFill>
+                  <a:schemeClr val="bg1"/>
+                </a:solidFill>
+                <a:latin typeface="Arial" panose="020B0604020202020204" pitchFamily="34" charset="0"/>
+                <a:cs typeface="Arial" panose="020B0604020202020204" pitchFamily="34" charset="0"/>
+              </a:rPr>
+              <a:t>  and </a:t>
+            </a:r>
+            <a:r>
+              <a:rPr lang="en-US" sz="1400" dirty="0" err="1">
+                <a:solidFill>
+                  <a:schemeClr val="bg1"/>
+                </a:solidFill>
+                <a:latin typeface="Arial" panose="020B0604020202020204" pitchFamily="34" charset="0"/>
+                <a:cs typeface="Arial" panose="020B0604020202020204" pitchFamily="34" charset="0"/>
+              </a:rPr>
+              <a:t>MatNWB</a:t>
+            </a:r>
+            <a:endParaRPr lang="en-US" sz="1400" dirty="0">
+              <a:solidFill>
+                <a:schemeClr val="bg1"/>
+              </a:solidFill>
+              <a:latin typeface="Arial" panose="020B0604020202020204" pitchFamily="34" charset="0"/>
+              <a:cs typeface="Arial" panose="020B0604020202020204" pitchFamily="34" charset="0"/>
+            </a:endParaRPr>
+          </a:p>
+        </p:txBody>
+      </p:sp>
+      <p:sp>
+        <p:nvSpPr>
+          <p:cNvPr id="21" name="Rounded Rectangle 20">
+            <a:extLst>
+              <a:ext uri="{FF2B5EF4-FFF2-40B4-BE49-F238E27FC236}">
+                <a16:creationId xmlns:a16="http://schemas.microsoft.com/office/drawing/2014/main" id="{7321DDB5-78B2-5F47-934C-64E1715C8E9C}"/>
+              </a:ext>
+            </a:extLst>
+          </p:cNvPr>
+          <p:cNvSpPr/>
+          <p:nvPr/>
+        </p:nvSpPr>
+        <p:spPr>
+          <a:xfrm>
+            <a:off x="5923109" y="4499527"/>
+            <a:ext cx="4389605" cy="468076"/>
+          </a:xfrm>
+          <a:prstGeom prst="roundRect">
+            <a:avLst/>
+          </a:prstGeom>
+          <a:solidFill>
+            <a:srgbClr val="6FA8DC"/>
+          </a:solidFill>
+          <a:ln w="28575">
+            <a:solidFill>
+              <a:schemeClr val="bg1"/>
+            </a:solidFill>
+          </a:ln>
+        </p:spPr>
+        <p:style>
+          <a:lnRef idx="2">
+            <a:schemeClr val="accent1">
+              <a:shade val="50000"/>
+            </a:schemeClr>
+          </a:lnRef>
+          <a:fillRef idx="1">
+            <a:schemeClr val="accent1"/>
+          </a:fillRef>
+          <a:effectRef idx="0">
+            <a:schemeClr val="accent1"/>
+          </a:effectRef>
+          <a:fontRef idx="minor">
+            <a:schemeClr val="lt1"/>
+          </a:fontRef>
+        </p:style>
+        <p:txBody>
+          <a:bodyPr rtlCol="0" anchor="ctr"/>
+          <a:lstStyle/>
+          <a:p>
+            <a:pPr marL="1028700" indent="-1023938"/>
+            <a:r>
+              <a:rPr lang="en-US" sz="1400" b="1" dirty="0">
+                <a:solidFill>
+                  <a:schemeClr val="bg1"/>
+                </a:solidFill>
+                <a:effectLst>
+                  <a:outerShdw blurRad="50800" dist="38100" dir="2700000" algn="tl" rotWithShape="0">
+                    <a:prstClr val="black">
+                      <a:alpha val="40000"/>
+                    </a:prstClr>
+                  </a:outerShdw>
+                </a:effectLst>
+                <a:latin typeface="Arial" panose="020B0604020202020204" pitchFamily="34" charset="0"/>
+                <a:cs typeface="Arial" panose="020B0604020202020204" pitchFamily="34" charset="0"/>
+              </a:rPr>
+              <a:t>Data Modeling: </a:t>
+            </a:r>
+            <a:r>
+              <a:rPr lang="en-US" sz="1400" dirty="0">
+                <a:solidFill>
+                  <a:schemeClr val="bg1"/>
+                </a:solidFill>
+                <a:latin typeface="Arial" panose="020B0604020202020204" pitchFamily="34" charset="0"/>
+                <a:cs typeface="Arial" panose="020B0604020202020204" pitchFamily="34" charset="0"/>
+              </a:rPr>
+              <a:t>HDMF, NDX Catalog, HDF5 storage and specification language specification</a:t>
+            </a:r>
+          </a:p>
+        </p:txBody>
+      </p:sp>
+    </p:spTree>
+    <p:extLst>
+      <p:ext uri="{BB962C8B-B14F-4D97-AF65-F5344CB8AC3E}">
+        <p14:creationId xmlns:p14="http://schemas.microsoft.com/office/powerpoint/2010/main" val="4160944956"/>
+      </p:ext>
+    </p:extLst>
+  </p:cSld>
+  <p:clrMapOvr>
+    <a:masterClrMapping/>
+  </p:clrMapOvr>
+</p:sld>
+</file>
+
+<file path=ppt/slides/slide2.xml><?xml version="1.0" encoding="utf-8"?>
 <p:sld xmlns:a="http://schemas.openxmlformats.org/drawingml/2006/main" xmlns:r="http://schemas.openxmlformats.org/officeDocument/2006/relationships" xmlns:p="http://schemas.openxmlformats.org/presentationml/2006/main">
   <p:cSld>
     <p:spTree>

</xml_diff>